<commit_message>
2020 S1 Final review plan
</commit_message>
<xml_diff>
--- a/LIRV/Week 8 - Modules 12/LI&R Valuation 2020 S1 Tutorial 7.pptx
+++ b/LIRV/Week 8 - Modules 12/LI&R Valuation 2020 S1 Tutorial 7.pptx
@@ -922,6 +922,13 @@
         </dgm:presLayoutVars>
       </dgm:prSet>
       <dgm:spPr/>
+      <dgm:t>
+        <a:bodyPr/>
+        <a:lstStyle/>
+        <a:p>
+          <a:endParaRPr lang="en-US"/>
+        </a:p>
+      </dgm:t>
     </dgm:pt>
   </dgm:ptLst>
   <dgm:cxnLst>
@@ -2282,7 +2289,7 @@
           <p:cNvPr id="5" name="Slide Number Placeholder 4">
             <a:extLst>
               <a:ext uri="{FF2B5EF4-FFF2-40B4-BE49-F238E27FC236}">
-                <a16:creationId xmlns:a16="http://schemas.microsoft.com/office/drawing/2014/main" id="{70220223-1CE7-4D32-BA61-C2C0D2678D33}"/>
+                <a16:creationId xmlns="" xmlns:a16="http://schemas.microsoft.com/office/drawing/2014/main" id="{70220223-1CE7-4D32-BA61-C2C0D2678D33}"/>
               </a:ext>
             </a:extLst>
           </p:cNvPr>
@@ -2323,7 +2330,7 @@
           <p:cNvPr id="6" name="TextBox 5">
             <a:extLst>
               <a:ext uri="{FF2B5EF4-FFF2-40B4-BE49-F238E27FC236}">
-                <a16:creationId xmlns:a16="http://schemas.microsoft.com/office/drawing/2014/main" id="{AD82A10A-EA57-491B-8D77-8481729B40CE}"/>
+                <a16:creationId xmlns="" xmlns:a16="http://schemas.microsoft.com/office/drawing/2014/main" id="{AD82A10A-EA57-491B-8D77-8481729B40CE}"/>
               </a:ext>
             </a:extLst>
           </p:cNvPr>
@@ -2365,7 +2372,7 @@
           <p:cNvPr id="7" name="TextBox 6">
             <a:extLst>
               <a:ext uri="{FF2B5EF4-FFF2-40B4-BE49-F238E27FC236}">
-                <a16:creationId xmlns:a16="http://schemas.microsoft.com/office/drawing/2014/main" id="{CAF9BB53-B3E2-4270-A2F1-10F8B31A33F0}"/>
+                <a16:creationId xmlns="" xmlns:a16="http://schemas.microsoft.com/office/drawing/2014/main" id="{CAF9BB53-B3E2-4270-A2F1-10F8B31A33F0}"/>
               </a:ext>
             </a:extLst>
           </p:cNvPr>
@@ -2407,7 +2414,7 @@
           <p:cNvPr id="8" name="Picture 7">
             <a:extLst>
               <a:ext uri="{FF2B5EF4-FFF2-40B4-BE49-F238E27FC236}">
-                <a16:creationId xmlns:a16="http://schemas.microsoft.com/office/drawing/2014/main" id="{BC320E09-1BED-479F-840D-1E50C513D545}"/>
+                <a16:creationId xmlns="" xmlns:a16="http://schemas.microsoft.com/office/drawing/2014/main" id="{BC320E09-1BED-479F-840D-1E50C513D545}"/>
               </a:ext>
             </a:extLst>
           </p:cNvPr>
@@ -2443,7 +2450,7 @@
           <p:cNvPr id="9" name="Footer Placeholder 4">
             <a:extLst>
               <a:ext uri="{FF2B5EF4-FFF2-40B4-BE49-F238E27FC236}">
-                <a16:creationId xmlns:a16="http://schemas.microsoft.com/office/drawing/2014/main" id="{2BC05C13-68C7-4FDB-9CFA-EFBD44CBDD98}"/>
+                <a16:creationId xmlns="" xmlns:a16="http://schemas.microsoft.com/office/drawing/2014/main" id="{2BC05C13-68C7-4FDB-9CFA-EFBD44CBDD98}"/>
               </a:ext>
             </a:extLst>
           </p:cNvPr>
@@ -2725,7 +2732,7 @@
           <p:cNvPr id="8" name="TextBox 7">
             <a:extLst>
               <a:ext uri="{FF2B5EF4-FFF2-40B4-BE49-F238E27FC236}">
-                <a16:creationId xmlns:a16="http://schemas.microsoft.com/office/drawing/2014/main" id="{58918AA9-B90E-4AAE-BBE5-1E5D8723630E}"/>
+                <a16:creationId xmlns="" xmlns:a16="http://schemas.microsoft.com/office/drawing/2014/main" id="{58918AA9-B90E-4AAE-BBE5-1E5D8723630E}"/>
               </a:ext>
             </a:extLst>
           </p:cNvPr>
@@ -2767,7 +2774,7 @@
           <p:cNvPr id="9" name="TextBox 8">
             <a:extLst>
               <a:ext uri="{FF2B5EF4-FFF2-40B4-BE49-F238E27FC236}">
-                <a16:creationId xmlns:a16="http://schemas.microsoft.com/office/drawing/2014/main" id="{01B511CE-A2F8-4D4C-A323-D4B850B5931B}"/>
+                <a16:creationId xmlns="" xmlns:a16="http://schemas.microsoft.com/office/drawing/2014/main" id="{01B511CE-A2F8-4D4C-A323-D4B850B5931B}"/>
               </a:ext>
             </a:extLst>
           </p:cNvPr>
@@ -2809,7 +2816,7 @@
           <p:cNvPr id="10" name="Picture 9">
             <a:extLst>
               <a:ext uri="{FF2B5EF4-FFF2-40B4-BE49-F238E27FC236}">
-                <a16:creationId xmlns:a16="http://schemas.microsoft.com/office/drawing/2014/main" id="{6140DF9C-6FDA-42A7-BF85-E54F2C77DBBD}"/>
+                <a16:creationId xmlns="" xmlns:a16="http://schemas.microsoft.com/office/drawing/2014/main" id="{6140DF9C-6FDA-42A7-BF85-E54F2C77DBBD}"/>
               </a:ext>
             </a:extLst>
           </p:cNvPr>
@@ -2845,7 +2852,7 @@
           <p:cNvPr id="11" name="Footer Placeholder 4">
             <a:extLst>
               <a:ext uri="{FF2B5EF4-FFF2-40B4-BE49-F238E27FC236}">
-                <a16:creationId xmlns:a16="http://schemas.microsoft.com/office/drawing/2014/main" id="{F50E382E-29B5-4C14-AABF-5FFD6910F40C}"/>
+                <a16:creationId xmlns="" xmlns:a16="http://schemas.microsoft.com/office/drawing/2014/main" id="{F50E382E-29B5-4C14-AABF-5FFD6910F40C}"/>
               </a:ext>
             </a:extLst>
           </p:cNvPr>
@@ -4662,7 +4669,7 @@
           <p:cNvPr id="15" name="Picture 14">
             <a:extLst>
               <a:ext uri="{FF2B5EF4-FFF2-40B4-BE49-F238E27FC236}">
-                <a16:creationId xmlns:a16="http://schemas.microsoft.com/office/drawing/2014/main" id="{1E1ACD97-F487-4181-B309-3C1DCC1A81A6}"/>
+                <a16:creationId xmlns="" xmlns:a16="http://schemas.microsoft.com/office/drawing/2014/main" id="{1E1ACD97-F487-4181-B309-3C1DCC1A81A6}"/>
               </a:ext>
             </a:extLst>
           </p:cNvPr>
@@ -4734,7 +4741,7 @@
           <p:cNvPr id="10" name="Picture 9">
             <a:extLst>
               <a:ext uri="{FF2B5EF4-FFF2-40B4-BE49-F238E27FC236}">
-                <a16:creationId xmlns:a16="http://schemas.microsoft.com/office/drawing/2014/main" id="{AFD5EF4B-BE8A-4B51-8CD1-844C068C2CF0}"/>
+                <a16:creationId xmlns="" xmlns:a16="http://schemas.microsoft.com/office/drawing/2014/main" id="{AFD5EF4B-BE8A-4B51-8CD1-844C068C2CF0}"/>
               </a:ext>
             </a:extLst>
           </p:cNvPr>
@@ -4770,7 +4777,7 @@
           <p:cNvPr id="11" name="Picture 10">
             <a:extLst>
               <a:ext uri="{FF2B5EF4-FFF2-40B4-BE49-F238E27FC236}">
-                <a16:creationId xmlns:a16="http://schemas.microsoft.com/office/drawing/2014/main" id="{FAD0F8B1-BD48-4BF0-A453-1710562F8196}"/>
+                <a16:creationId xmlns="" xmlns:a16="http://schemas.microsoft.com/office/drawing/2014/main" id="{FAD0F8B1-BD48-4BF0-A453-1710562F8196}"/>
               </a:ext>
             </a:extLst>
           </p:cNvPr>
@@ -4806,7 +4813,7 @@
           <p:cNvPr id="19" name="Picture 18">
             <a:extLst>
               <a:ext uri="{FF2B5EF4-FFF2-40B4-BE49-F238E27FC236}">
-                <a16:creationId xmlns:a16="http://schemas.microsoft.com/office/drawing/2014/main" id="{77F25A21-E429-4C29-A78B-0C1168F661F0}"/>
+                <a16:creationId xmlns="" xmlns:a16="http://schemas.microsoft.com/office/drawing/2014/main" id="{77F25A21-E429-4C29-A78B-0C1168F661F0}"/>
               </a:ext>
             </a:extLst>
           </p:cNvPr>
@@ -4892,7 +4899,7 @@
           <p:cNvPr id="8" name="Rectangle 7">
             <a:extLst>
               <a:ext uri="{FF2B5EF4-FFF2-40B4-BE49-F238E27FC236}">
-                <a16:creationId xmlns:a16="http://schemas.microsoft.com/office/drawing/2014/main" id="{F63EE81A-EAB2-47E3-AD71-886CE9E5BCE2}"/>
+                <a16:creationId xmlns="" xmlns:a16="http://schemas.microsoft.com/office/drawing/2014/main" id="{F63EE81A-EAB2-47E3-AD71-886CE9E5BCE2}"/>
               </a:ext>
             </a:extLst>
           </p:cNvPr>
@@ -4944,7 +4951,7 @@
           <p:cNvPr id="5" name="Rectangle 4">
             <a:extLst>
               <a:ext uri="{FF2B5EF4-FFF2-40B4-BE49-F238E27FC236}">
-                <a16:creationId xmlns:a16="http://schemas.microsoft.com/office/drawing/2014/main" id="{B307B772-29F5-4799-B12E-F99BE1FDB609}"/>
+                <a16:creationId xmlns="" xmlns:a16="http://schemas.microsoft.com/office/drawing/2014/main" id="{B307B772-29F5-4799-B12E-F99BE1FDB609}"/>
               </a:ext>
             </a:extLst>
           </p:cNvPr>
@@ -4996,7 +5003,7 @@
           <p:cNvPr id="2" name="Picture 1">
             <a:extLst>
               <a:ext uri="{FF2B5EF4-FFF2-40B4-BE49-F238E27FC236}">
-                <a16:creationId xmlns:a16="http://schemas.microsoft.com/office/drawing/2014/main" id="{A5266E5F-568D-440E-B3C1-BB88075D38C7}"/>
+                <a16:creationId xmlns="" xmlns:a16="http://schemas.microsoft.com/office/drawing/2014/main" id="{A5266E5F-568D-440E-B3C1-BB88075D38C7}"/>
               </a:ext>
             </a:extLst>
           </p:cNvPr>
@@ -5033,7 +5040,7 @@
           <p:cNvPr id="4" name="Picture 3">
             <a:extLst>
               <a:ext uri="{FF2B5EF4-FFF2-40B4-BE49-F238E27FC236}">
-                <a16:creationId xmlns:a16="http://schemas.microsoft.com/office/drawing/2014/main" id="{937F77EE-00A7-440F-A593-5EF57A23B1B1}"/>
+                <a16:creationId xmlns="" xmlns:a16="http://schemas.microsoft.com/office/drawing/2014/main" id="{937F77EE-00A7-440F-A593-5EF57A23B1B1}"/>
               </a:ext>
             </a:extLst>
           </p:cNvPr>
@@ -5069,7 +5076,7 @@
           <p:cNvPr id="6" name="TextBox 5">
             <a:extLst>
               <a:ext uri="{FF2B5EF4-FFF2-40B4-BE49-F238E27FC236}">
-                <a16:creationId xmlns:a16="http://schemas.microsoft.com/office/drawing/2014/main" id="{D816AFC7-B04E-480C-8A4A-C2D79203A156}"/>
+                <a16:creationId xmlns="" xmlns:a16="http://schemas.microsoft.com/office/drawing/2014/main" id="{D816AFC7-B04E-480C-8A4A-C2D79203A156}"/>
               </a:ext>
             </a:extLst>
           </p:cNvPr>
@@ -5237,7 +5244,7 @@
           <p:cNvPr id="7" name="TextBox 6">
             <a:extLst>
               <a:ext uri="{FF2B5EF4-FFF2-40B4-BE49-F238E27FC236}">
-                <a16:creationId xmlns:a16="http://schemas.microsoft.com/office/drawing/2014/main" id="{0354E28C-FA5C-4664-84AB-C75731FAE08D}"/>
+                <a16:creationId xmlns="" xmlns:a16="http://schemas.microsoft.com/office/drawing/2014/main" id="{0354E28C-FA5C-4664-84AB-C75731FAE08D}"/>
               </a:ext>
             </a:extLst>
           </p:cNvPr>
@@ -5484,7 +5491,7 @@
           <p:cNvPr id="12" name="Rectangle 11">
             <a:extLst>
               <a:ext uri="{FF2B5EF4-FFF2-40B4-BE49-F238E27FC236}">
-                <a16:creationId xmlns:a16="http://schemas.microsoft.com/office/drawing/2014/main" id="{E67E783B-7210-4269-9A7E-23DEB8A720AB}"/>
+                <a16:creationId xmlns="" xmlns:a16="http://schemas.microsoft.com/office/drawing/2014/main" id="{E67E783B-7210-4269-9A7E-23DEB8A720AB}"/>
               </a:ext>
             </a:extLst>
           </p:cNvPr>
@@ -5689,7 +5696,7 @@
           <p:cNvPr id="7" name="Rectangle 6">
             <a:extLst>
               <a:ext uri="{FF2B5EF4-FFF2-40B4-BE49-F238E27FC236}">
-                <a16:creationId xmlns:a16="http://schemas.microsoft.com/office/drawing/2014/main" id="{4BB3B729-EDCB-49F8-8DAA-328B05C7BA1C}"/>
+                <a16:creationId xmlns="" xmlns:a16="http://schemas.microsoft.com/office/drawing/2014/main" id="{4BB3B729-EDCB-49F8-8DAA-328B05C7BA1C}"/>
               </a:ext>
             </a:extLst>
           </p:cNvPr>
@@ -5741,7 +5748,7 @@
           <p:cNvPr id="8" name="Picture 7">
             <a:extLst>
               <a:ext uri="{FF2B5EF4-FFF2-40B4-BE49-F238E27FC236}">
-                <a16:creationId xmlns:a16="http://schemas.microsoft.com/office/drawing/2014/main" id="{6FA4BCFB-BEE0-4855-8461-6927F405F8B9}"/>
+                <a16:creationId xmlns="" xmlns:a16="http://schemas.microsoft.com/office/drawing/2014/main" id="{6FA4BCFB-BEE0-4855-8461-6927F405F8B9}"/>
               </a:ext>
             </a:extLst>
           </p:cNvPr>
@@ -5777,7 +5784,7 @@
           <p:cNvPr id="11" name="Picture 10">
             <a:extLst>
               <a:ext uri="{FF2B5EF4-FFF2-40B4-BE49-F238E27FC236}">
-                <a16:creationId xmlns:a16="http://schemas.microsoft.com/office/drawing/2014/main" id="{58EBF04E-1F5A-4655-943A-07CCADD2C2AE}"/>
+                <a16:creationId xmlns="" xmlns:a16="http://schemas.microsoft.com/office/drawing/2014/main" id="{58EBF04E-1F5A-4655-943A-07CCADD2C2AE}"/>
               </a:ext>
             </a:extLst>
           </p:cNvPr>
@@ -5930,7 +5937,7 @@
           <p:cNvPr id="7" name="Rectangle 6">
             <a:extLst>
               <a:ext uri="{FF2B5EF4-FFF2-40B4-BE49-F238E27FC236}">
-                <a16:creationId xmlns:a16="http://schemas.microsoft.com/office/drawing/2014/main" id="{A1AFE8FA-3B11-43AB-A928-90BC02C622D3}"/>
+                <a16:creationId xmlns="" xmlns:a16="http://schemas.microsoft.com/office/drawing/2014/main" id="{A1AFE8FA-3B11-43AB-A928-90BC02C622D3}"/>
               </a:ext>
             </a:extLst>
           </p:cNvPr>
@@ -6046,7 +6053,7 @@
           <p:cNvPr id="5" name="Picture 4">
             <a:extLst>
               <a:ext uri="{FF2B5EF4-FFF2-40B4-BE49-F238E27FC236}">
-                <a16:creationId xmlns:a16="http://schemas.microsoft.com/office/drawing/2014/main" id="{5471131F-B562-4F07-85C8-7DECF41E91DA}"/>
+                <a16:creationId xmlns="" xmlns:a16="http://schemas.microsoft.com/office/drawing/2014/main" id="{5471131F-B562-4F07-85C8-7DECF41E91DA}"/>
               </a:ext>
             </a:extLst>
           </p:cNvPr>
@@ -6113,7 +6120,7 @@
           <p:cNvPr id="11" name="Rectangle 10">
             <a:extLst>
               <a:ext uri="{FF2B5EF4-FFF2-40B4-BE49-F238E27FC236}">
-                <a16:creationId xmlns:a16="http://schemas.microsoft.com/office/drawing/2014/main" id="{27C844A5-7861-4B85-82D6-A1605AE07964}"/>
+                <a16:creationId xmlns="" xmlns:a16="http://schemas.microsoft.com/office/drawing/2014/main" id="{27C844A5-7861-4B85-82D6-A1605AE07964}"/>
               </a:ext>
             </a:extLst>
           </p:cNvPr>
@@ -6229,7 +6236,7 @@
           <p:cNvPr id="6" name="Picture 5">
             <a:extLst>
               <a:ext uri="{FF2B5EF4-FFF2-40B4-BE49-F238E27FC236}">
-                <a16:creationId xmlns:a16="http://schemas.microsoft.com/office/drawing/2014/main" id="{6273FF2B-672B-41BD-BCF9-AB1387D2F998}"/>
+                <a16:creationId xmlns="" xmlns:a16="http://schemas.microsoft.com/office/drawing/2014/main" id="{6273FF2B-672B-41BD-BCF9-AB1387D2F998}"/>
               </a:ext>
             </a:extLst>
           </p:cNvPr>
@@ -6264,7 +6271,7 @@
           <p:cNvPr id="9" name="Picture 8">
             <a:extLst>
               <a:ext uri="{FF2B5EF4-FFF2-40B4-BE49-F238E27FC236}">
-                <a16:creationId xmlns:a16="http://schemas.microsoft.com/office/drawing/2014/main" id="{B16FD934-5AAB-4F35-ADFF-1244D45C28B1}"/>
+                <a16:creationId xmlns="" xmlns:a16="http://schemas.microsoft.com/office/drawing/2014/main" id="{B16FD934-5AAB-4F35-ADFF-1244D45C28B1}"/>
               </a:ext>
             </a:extLst>
           </p:cNvPr>
@@ -6300,7 +6307,7 @@
           <p:cNvPr id="10" name="Picture 9">
             <a:extLst>
               <a:ext uri="{FF2B5EF4-FFF2-40B4-BE49-F238E27FC236}">
-                <a16:creationId xmlns:a16="http://schemas.microsoft.com/office/drawing/2014/main" id="{43487347-6A75-4378-96F1-5FF0DD0D19F4}"/>
+                <a16:creationId xmlns="" xmlns:a16="http://schemas.microsoft.com/office/drawing/2014/main" id="{43487347-6A75-4378-96F1-5FF0DD0D19F4}"/>
               </a:ext>
             </a:extLst>
           </p:cNvPr>
@@ -7331,7 +7338,7 @@
           <p:cNvPr id="7" name="TextBox 6">
             <a:extLst>
               <a:ext uri="{FF2B5EF4-FFF2-40B4-BE49-F238E27FC236}">
-                <a16:creationId xmlns:a16="http://schemas.microsoft.com/office/drawing/2014/main" id="{EF235E79-44F4-459B-830F-1D7B76749BFE}"/>
+                <a16:creationId xmlns="" xmlns:a16="http://schemas.microsoft.com/office/drawing/2014/main" id="{EF235E79-44F4-459B-830F-1D7B76749BFE}"/>
               </a:ext>
             </a:extLst>
           </p:cNvPr>
@@ -7380,7 +7387,7 @@
           <p:cNvPr id="9" name="TextBox 8">
             <a:extLst>
               <a:ext uri="{FF2B5EF4-FFF2-40B4-BE49-F238E27FC236}">
-                <a16:creationId xmlns:a16="http://schemas.microsoft.com/office/drawing/2014/main" id="{AA0CA0E8-2A53-45BC-86C9-FE223F99B19D}"/>
+                <a16:creationId xmlns="" xmlns:a16="http://schemas.microsoft.com/office/drawing/2014/main" id="{AA0CA0E8-2A53-45BC-86C9-FE223F99B19D}"/>
               </a:ext>
             </a:extLst>
           </p:cNvPr>
@@ -7429,7 +7436,7 @@
           <p:cNvPr id="11" name="Footer Placeholder 4">
             <a:extLst>
               <a:ext uri="{FF2B5EF4-FFF2-40B4-BE49-F238E27FC236}">
-                <a16:creationId xmlns:a16="http://schemas.microsoft.com/office/drawing/2014/main" id="{009DDCB5-19E8-415F-A840-5AE8651D99E5}"/>
+                <a16:creationId xmlns="" xmlns:a16="http://schemas.microsoft.com/office/drawing/2014/main" id="{009DDCB5-19E8-415F-A840-5AE8651D99E5}"/>
               </a:ext>
             </a:extLst>
           </p:cNvPr>
@@ -7558,7 +7565,7 @@
           <p:cNvPr id="12" name="Slide Number Placeholder 5">
             <a:extLst>
               <a:ext uri="{FF2B5EF4-FFF2-40B4-BE49-F238E27FC236}">
-                <a16:creationId xmlns:a16="http://schemas.microsoft.com/office/drawing/2014/main" id="{308D2600-837B-4C62-8D76-E8D49F430D64}"/>
+                <a16:creationId xmlns="" xmlns:a16="http://schemas.microsoft.com/office/drawing/2014/main" id="{308D2600-837B-4C62-8D76-E8D49F430D64}"/>
               </a:ext>
             </a:extLst>
           </p:cNvPr>
@@ -7697,7 +7704,7 @@
           <p:cNvPr id="10" name="Picture 9">
             <a:extLst>
               <a:ext uri="{FF2B5EF4-FFF2-40B4-BE49-F238E27FC236}">
-                <a16:creationId xmlns:a16="http://schemas.microsoft.com/office/drawing/2014/main" id="{CFB75BB4-0E10-4B4C-9724-FD602EA472CD}"/>
+                <a16:creationId xmlns="" xmlns:a16="http://schemas.microsoft.com/office/drawing/2014/main" id="{CFB75BB4-0E10-4B4C-9724-FD602EA472CD}"/>
               </a:ext>
             </a:extLst>
           </p:cNvPr>
@@ -8096,7 +8103,7 @@
           <p:cNvPr id="2" name="Title 1">
             <a:extLst>
               <a:ext uri="{FF2B5EF4-FFF2-40B4-BE49-F238E27FC236}">
-                <a16:creationId xmlns:a16="http://schemas.microsoft.com/office/drawing/2014/main" id="{0D990963-4025-41EF-A861-89C16B21BD06}"/>
+                <a16:creationId xmlns="" xmlns:a16="http://schemas.microsoft.com/office/drawing/2014/main" id="{0D990963-4025-41EF-A861-89C16B21BD06}"/>
               </a:ext>
             </a:extLst>
           </p:cNvPr>
@@ -8161,7 +8168,7 @@
           <p:cNvPr id="2" name="Title 1">
             <a:extLst>
               <a:ext uri="{FF2B5EF4-FFF2-40B4-BE49-F238E27FC236}">
-                <a16:creationId xmlns:a16="http://schemas.microsoft.com/office/drawing/2014/main" id="{7776D5B1-2B60-4A37-BA07-CFB5AB4EBEC1}"/>
+                <a16:creationId xmlns="" xmlns:a16="http://schemas.microsoft.com/office/drawing/2014/main" id="{7776D5B1-2B60-4A37-BA07-CFB5AB4EBEC1}"/>
               </a:ext>
             </a:extLst>
           </p:cNvPr>
@@ -8191,7 +8198,7 @@
           <p:cNvPr id="3" name="Content Placeholder 2">
             <a:extLst>
               <a:ext uri="{FF2B5EF4-FFF2-40B4-BE49-F238E27FC236}">
-                <a16:creationId xmlns:a16="http://schemas.microsoft.com/office/drawing/2014/main" id="{3A44430D-A62E-4AF3-A7F8-C1F98F0F0CE1}"/>
+                <a16:creationId xmlns="" xmlns:a16="http://schemas.microsoft.com/office/drawing/2014/main" id="{3A44430D-A62E-4AF3-A7F8-C1F98F0F0CE1}"/>
               </a:ext>
             </a:extLst>
           </p:cNvPr>
@@ -8274,7 +8281,7 @@
           <p:cNvPr id="2" name="Title 1">
             <a:extLst>
               <a:ext uri="{FF2B5EF4-FFF2-40B4-BE49-F238E27FC236}">
-                <a16:creationId xmlns:a16="http://schemas.microsoft.com/office/drawing/2014/main" id="{7776D5B1-2B60-4A37-BA07-CFB5AB4EBEC1}"/>
+                <a16:creationId xmlns="" xmlns:a16="http://schemas.microsoft.com/office/drawing/2014/main" id="{7776D5B1-2B60-4A37-BA07-CFB5AB4EBEC1}"/>
               </a:ext>
             </a:extLst>
           </p:cNvPr>
@@ -8304,7 +8311,7 @@
           <p:cNvPr id="3" name="Content Placeholder 2">
             <a:extLst>
               <a:ext uri="{FF2B5EF4-FFF2-40B4-BE49-F238E27FC236}">
-                <a16:creationId xmlns:a16="http://schemas.microsoft.com/office/drawing/2014/main" id="{3A44430D-A62E-4AF3-A7F8-C1F98F0F0CE1}"/>
+                <a16:creationId xmlns="" xmlns:a16="http://schemas.microsoft.com/office/drawing/2014/main" id="{3A44430D-A62E-4AF3-A7F8-C1F98F0F0CE1}"/>
               </a:ext>
             </a:extLst>
           </p:cNvPr>
@@ -8342,7 +8349,7 @@
           <p:cNvPr id="6" name="Table 5">
             <a:extLst>
               <a:ext uri="{FF2B5EF4-FFF2-40B4-BE49-F238E27FC236}">
-                <a16:creationId xmlns:a16="http://schemas.microsoft.com/office/drawing/2014/main" id="{258E0BF7-4B36-4BFD-B46B-02718587134B}"/>
+                <a16:creationId xmlns="" xmlns:a16="http://schemas.microsoft.com/office/drawing/2014/main" id="{258E0BF7-4B36-4BFD-B46B-02718587134B}"/>
               </a:ext>
             </a:extLst>
           </p:cNvPr>
@@ -8371,56 +8378,56 @@
                 <a:gridCol w="1194938">
                   <a:extLst>
                     <a:ext uri="{9D8B030D-6E8A-4147-A177-3AD203B41FA5}">
-                      <a16:colId xmlns:a16="http://schemas.microsoft.com/office/drawing/2014/main" val="2979479705"/>
+                      <a16:colId xmlns="" xmlns:a16="http://schemas.microsoft.com/office/drawing/2014/main" val="2979479705"/>
                     </a:ext>
                   </a:extLst>
                 </a:gridCol>
                 <a:gridCol w="1051743">
                   <a:extLst>
                     <a:ext uri="{9D8B030D-6E8A-4147-A177-3AD203B41FA5}">
-                      <a16:colId xmlns:a16="http://schemas.microsoft.com/office/drawing/2014/main" val="1608670210"/>
+                      <a16:colId xmlns="" xmlns:a16="http://schemas.microsoft.com/office/drawing/2014/main" val="1608670210"/>
                     </a:ext>
                   </a:extLst>
                 </a:gridCol>
                 <a:gridCol w="1178479">
                   <a:extLst>
                     <a:ext uri="{9D8B030D-6E8A-4147-A177-3AD203B41FA5}">
-                      <a16:colId xmlns:a16="http://schemas.microsoft.com/office/drawing/2014/main" val="1783565452"/>
+                      <a16:colId xmlns="" xmlns:a16="http://schemas.microsoft.com/office/drawing/2014/main" val="1783565452"/>
                     </a:ext>
                   </a:extLst>
                 </a:gridCol>
                 <a:gridCol w="916777">
                   <a:extLst>
                     <a:ext uri="{9D8B030D-6E8A-4147-A177-3AD203B41FA5}">
-                      <a16:colId xmlns:a16="http://schemas.microsoft.com/office/drawing/2014/main" val="4132468205"/>
+                      <a16:colId xmlns="" xmlns:a16="http://schemas.microsoft.com/office/drawing/2014/main" val="4132468205"/>
                     </a:ext>
                   </a:extLst>
                 </a:gridCol>
                 <a:gridCol w="972739">
                   <a:extLst>
                     <a:ext uri="{9D8B030D-6E8A-4147-A177-3AD203B41FA5}">
-                      <a16:colId xmlns:a16="http://schemas.microsoft.com/office/drawing/2014/main" val="1900238534"/>
+                      <a16:colId xmlns="" xmlns:a16="http://schemas.microsoft.com/office/drawing/2014/main" val="1900238534"/>
                     </a:ext>
                   </a:extLst>
                 </a:gridCol>
                 <a:gridCol w="1020470">
                   <a:extLst>
                     <a:ext uri="{9D8B030D-6E8A-4147-A177-3AD203B41FA5}">
-                      <a16:colId xmlns:a16="http://schemas.microsoft.com/office/drawing/2014/main" val="3310681958"/>
+                      <a16:colId xmlns="" xmlns:a16="http://schemas.microsoft.com/office/drawing/2014/main" val="3310681958"/>
                     </a:ext>
                   </a:extLst>
                 </a:gridCol>
                 <a:gridCol w="956280">
                   <a:extLst>
                     <a:ext uri="{9D8B030D-6E8A-4147-A177-3AD203B41FA5}">
-                      <a16:colId xmlns:a16="http://schemas.microsoft.com/office/drawing/2014/main" val="2294867794"/>
+                      <a16:colId xmlns="" xmlns:a16="http://schemas.microsoft.com/office/drawing/2014/main" val="2294867794"/>
                     </a:ext>
                   </a:extLst>
                 </a:gridCol>
                 <a:gridCol w="938174">
                   <a:extLst>
                     <a:ext uri="{9D8B030D-6E8A-4147-A177-3AD203B41FA5}">
-                      <a16:colId xmlns:a16="http://schemas.microsoft.com/office/drawing/2014/main" val="63493815"/>
+                      <a16:colId xmlns="" xmlns:a16="http://schemas.microsoft.com/office/drawing/2014/main" val="63493815"/>
                     </a:ext>
                   </a:extLst>
                 </a:gridCol>
@@ -8750,7 +8757,7 @@
                 </a:tc>
                 <a:extLst>
                   <a:ext uri="{0D108BD9-81ED-4DB2-BD59-A6C34878D82A}">
-                    <a16:rowId xmlns:a16="http://schemas.microsoft.com/office/drawing/2014/main" val="4163871923"/>
+                    <a16:rowId xmlns="" xmlns:a16="http://schemas.microsoft.com/office/drawing/2014/main" val="4163871923"/>
                   </a:ext>
                 </a:extLst>
               </a:tr>
@@ -9013,7 +9020,7 @@
                 </a:tc>
                 <a:extLst>
                   <a:ext uri="{0D108BD9-81ED-4DB2-BD59-A6C34878D82A}">
-                    <a16:rowId xmlns:a16="http://schemas.microsoft.com/office/drawing/2014/main" val="2046651926"/>
+                    <a16:rowId xmlns="" xmlns:a16="http://schemas.microsoft.com/office/drawing/2014/main" val="2046651926"/>
                   </a:ext>
                 </a:extLst>
               </a:tr>
@@ -9276,7 +9283,7 @@
                 </a:tc>
                 <a:extLst>
                   <a:ext uri="{0D108BD9-81ED-4DB2-BD59-A6C34878D82A}">
-                    <a16:rowId xmlns:a16="http://schemas.microsoft.com/office/drawing/2014/main" val="1083358242"/>
+                    <a16:rowId xmlns="" xmlns:a16="http://schemas.microsoft.com/office/drawing/2014/main" val="1083358242"/>
                   </a:ext>
                 </a:extLst>
               </a:tr>
@@ -9539,7 +9546,7 @@
                 </a:tc>
                 <a:extLst>
                   <a:ext uri="{0D108BD9-81ED-4DB2-BD59-A6C34878D82A}">
-                    <a16:rowId xmlns:a16="http://schemas.microsoft.com/office/drawing/2014/main" val="4262225356"/>
+                    <a16:rowId xmlns="" xmlns:a16="http://schemas.microsoft.com/office/drawing/2014/main" val="4262225356"/>
                   </a:ext>
                 </a:extLst>
               </a:tr>
@@ -9802,7 +9809,7 @@
                 </a:tc>
                 <a:extLst>
                   <a:ext uri="{0D108BD9-81ED-4DB2-BD59-A6C34878D82A}">
-                    <a16:rowId xmlns:a16="http://schemas.microsoft.com/office/drawing/2014/main" val="1584972896"/>
+                    <a16:rowId xmlns="" xmlns:a16="http://schemas.microsoft.com/office/drawing/2014/main" val="1584972896"/>
                   </a:ext>
                 </a:extLst>
               </a:tr>
@@ -10071,7 +10078,7 @@
                 </a:tc>
                 <a:extLst>
                   <a:ext uri="{0D108BD9-81ED-4DB2-BD59-A6C34878D82A}">
-                    <a16:rowId xmlns:a16="http://schemas.microsoft.com/office/drawing/2014/main" val="24928547"/>
+                    <a16:rowId xmlns="" xmlns:a16="http://schemas.microsoft.com/office/drawing/2014/main" val="24928547"/>
                   </a:ext>
                 </a:extLst>
               </a:tr>
@@ -10334,7 +10341,7 @@
                 </a:tc>
                 <a:extLst>
                   <a:ext uri="{0D108BD9-81ED-4DB2-BD59-A6C34878D82A}">
-                    <a16:rowId xmlns:a16="http://schemas.microsoft.com/office/drawing/2014/main" val="729550150"/>
+                    <a16:rowId xmlns="" xmlns:a16="http://schemas.microsoft.com/office/drawing/2014/main" val="729550150"/>
                   </a:ext>
                 </a:extLst>
               </a:tr>
@@ -10597,7 +10604,7 @@
                 </a:tc>
                 <a:extLst>
                   <a:ext uri="{0D108BD9-81ED-4DB2-BD59-A6C34878D82A}">
-                    <a16:rowId xmlns:a16="http://schemas.microsoft.com/office/drawing/2014/main" val="3222930552"/>
+                    <a16:rowId xmlns="" xmlns:a16="http://schemas.microsoft.com/office/drawing/2014/main" val="3222930552"/>
                   </a:ext>
                 </a:extLst>
               </a:tr>
@@ -10860,7 +10867,7 @@
                 </a:tc>
                 <a:extLst>
                   <a:ext uri="{0D108BD9-81ED-4DB2-BD59-A6C34878D82A}">
-                    <a16:rowId xmlns:a16="http://schemas.microsoft.com/office/drawing/2014/main" val="2897698863"/>
+                    <a16:rowId xmlns="" xmlns:a16="http://schemas.microsoft.com/office/drawing/2014/main" val="2897698863"/>
                   </a:ext>
                 </a:extLst>
               </a:tr>
@@ -10873,7 +10880,7 @@
           <p:cNvPr id="7" name="Rectangle 1">
             <a:extLst>
               <a:ext uri="{FF2B5EF4-FFF2-40B4-BE49-F238E27FC236}">
-                <a16:creationId xmlns:a16="http://schemas.microsoft.com/office/drawing/2014/main" id="{BEEDC022-94A0-4156-8F0B-8AB23463D9D9}"/>
+                <a16:creationId xmlns="" xmlns:a16="http://schemas.microsoft.com/office/drawing/2014/main" id="{BEEDC022-94A0-4156-8F0B-8AB23463D9D9}"/>
               </a:ext>
             </a:extLst>
           </p:cNvPr>
@@ -10972,7 +10979,7 @@
           <p:cNvPr id="2" name="Title 1">
             <a:extLst>
               <a:ext uri="{FF2B5EF4-FFF2-40B4-BE49-F238E27FC236}">
-                <a16:creationId xmlns:a16="http://schemas.microsoft.com/office/drawing/2014/main" id="{7776D5B1-2B60-4A37-BA07-CFB5AB4EBEC1}"/>
+                <a16:creationId xmlns="" xmlns:a16="http://schemas.microsoft.com/office/drawing/2014/main" id="{7776D5B1-2B60-4A37-BA07-CFB5AB4EBEC1}"/>
               </a:ext>
             </a:extLst>
           </p:cNvPr>
@@ -11002,7 +11009,7 @@
           <p:cNvPr id="3" name="Content Placeholder 2">
             <a:extLst>
               <a:ext uri="{FF2B5EF4-FFF2-40B4-BE49-F238E27FC236}">
-                <a16:creationId xmlns:a16="http://schemas.microsoft.com/office/drawing/2014/main" id="{3A44430D-A62E-4AF3-A7F8-C1F98F0F0CE1}"/>
+                <a16:creationId xmlns="" xmlns:a16="http://schemas.microsoft.com/office/drawing/2014/main" id="{3A44430D-A62E-4AF3-A7F8-C1F98F0F0CE1}"/>
               </a:ext>
             </a:extLst>
           </p:cNvPr>
@@ -11091,7 +11098,7 @@
           <p:cNvPr id="2" name="Title 1">
             <a:extLst>
               <a:ext uri="{FF2B5EF4-FFF2-40B4-BE49-F238E27FC236}">
-                <a16:creationId xmlns:a16="http://schemas.microsoft.com/office/drawing/2014/main" id="{7776D5B1-2B60-4A37-BA07-CFB5AB4EBEC1}"/>
+                <a16:creationId xmlns="" xmlns:a16="http://schemas.microsoft.com/office/drawing/2014/main" id="{7776D5B1-2B60-4A37-BA07-CFB5AB4EBEC1}"/>
               </a:ext>
             </a:extLst>
           </p:cNvPr>
@@ -11121,7 +11128,7 @@
           <p:cNvPr id="3" name="Content Placeholder 2">
             <a:extLst>
               <a:ext uri="{FF2B5EF4-FFF2-40B4-BE49-F238E27FC236}">
-                <a16:creationId xmlns:a16="http://schemas.microsoft.com/office/drawing/2014/main" id="{3A44430D-A62E-4AF3-A7F8-C1F98F0F0CE1}"/>
+                <a16:creationId xmlns="" xmlns:a16="http://schemas.microsoft.com/office/drawing/2014/main" id="{3A44430D-A62E-4AF3-A7F8-C1F98F0F0CE1}"/>
               </a:ext>
             </a:extLst>
           </p:cNvPr>
@@ -11284,7 +11291,7 @@
           <p:cNvPr id="2" name="Title 1">
             <a:extLst>
               <a:ext uri="{FF2B5EF4-FFF2-40B4-BE49-F238E27FC236}">
-                <a16:creationId xmlns:a16="http://schemas.microsoft.com/office/drawing/2014/main" id="{7776D5B1-2B60-4A37-BA07-CFB5AB4EBEC1}"/>
+                <a16:creationId xmlns="" xmlns:a16="http://schemas.microsoft.com/office/drawing/2014/main" id="{7776D5B1-2B60-4A37-BA07-CFB5AB4EBEC1}"/>
               </a:ext>
             </a:extLst>
           </p:cNvPr>
@@ -11314,7 +11321,7 @@
           <p:cNvPr id="3" name="Content Placeholder 2">
             <a:extLst>
               <a:ext uri="{FF2B5EF4-FFF2-40B4-BE49-F238E27FC236}">
-                <a16:creationId xmlns:a16="http://schemas.microsoft.com/office/drawing/2014/main" id="{3A44430D-A62E-4AF3-A7F8-C1F98F0F0CE1}"/>
+                <a16:creationId xmlns="" xmlns:a16="http://schemas.microsoft.com/office/drawing/2014/main" id="{3A44430D-A62E-4AF3-A7F8-C1F98F0F0CE1}"/>
               </a:ext>
             </a:extLst>
           </p:cNvPr>
@@ -11464,8 +11471,61 @@
           <a:p>
             <a:r>
               <a:rPr lang="en-US" sz="1400" dirty="0"/>
-              <a:t>Closing assets = (100+50)*(1+0%) -20 = 130.</a:t>
-            </a:r>
+              <a:t>Closing assets = (100+50)*(1+</a:t>
+            </a:r>
+            <a:r>
+              <a:rPr lang="en-US" sz="1400" dirty="0">
+                <a:solidFill>
+                  <a:srgbClr val="C00000"/>
+                </a:solidFill>
+              </a:rPr>
+              <a:t>0%</a:t>
+            </a:r>
+            <a:r>
+              <a:rPr lang="en-US" sz="1400" dirty="0"/>
+              <a:t>) -</a:t>
+            </a:r>
+            <a:r>
+              <a:rPr lang="en-US" sz="1400" dirty="0">
+                <a:solidFill>
+                  <a:srgbClr val="C00000"/>
+                </a:solidFill>
+              </a:rPr>
+              <a:t>20</a:t>
+            </a:r>
+            <a:r>
+              <a:rPr lang="en-US" sz="1400" dirty="0"/>
+              <a:t> = 130</a:t>
+            </a:r>
+            <a:r>
+              <a:rPr lang="en-US" sz="1400" dirty="0" smtClean="0"/>
+              <a:t>.   </a:t>
+            </a:r>
+            <a:r>
+              <a:rPr lang="en-US" sz="1400" i="1" dirty="0" smtClean="0">
+                <a:solidFill>
+                  <a:srgbClr val="C00000"/>
+                </a:solidFill>
+              </a:rPr>
+              <a:t>0% is the actual return;</a:t>
+            </a:r>
+            <a:r>
+              <a:rPr lang="en-US" sz="1400" dirty="0" smtClean="0"/>
+              <a:t> </a:t>
+            </a:r>
+            <a:r>
+              <a:rPr lang="en-US" sz="1400" i="1" dirty="0" smtClean="0">
+                <a:solidFill>
+                  <a:srgbClr val="C00000"/>
+                </a:solidFill>
+              </a:rPr>
+              <a:t>20 is the actual expense</a:t>
+            </a:r>
+            <a:endParaRPr lang="en-US" sz="1400" i="1" dirty="0">
+              <a:solidFill>
+                <a:srgbClr val="C00000"/>
+              </a:solidFill>
+            </a:endParaRPr>
           </a:p>
           <a:p>
             <a:r>
@@ -11574,7 +11634,7 @@
           <p:cNvPr id="2" name="Title 1">
             <a:extLst>
               <a:ext uri="{FF2B5EF4-FFF2-40B4-BE49-F238E27FC236}">
-                <a16:creationId xmlns:a16="http://schemas.microsoft.com/office/drawing/2014/main" id="{7776D5B1-2B60-4A37-BA07-CFB5AB4EBEC1}"/>
+                <a16:creationId xmlns="" xmlns:a16="http://schemas.microsoft.com/office/drawing/2014/main" id="{7776D5B1-2B60-4A37-BA07-CFB5AB4EBEC1}"/>
               </a:ext>
             </a:extLst>
           </p:cNvPr>
@@ -11604,7 +11664,7 @@
           <p:cNvPr id="3" name="Content Placeholder 2">
             <a:extLst>
               <a:ext uri="{FF2B5EF4-FFF2-40B4-BE49-F238E27FC236}">
-                <a16:creationId xmlns:a16="http://schemas.microsoft.com/office/drawing/2014/main" id="{3A44430D-A62E-4AF3-A7F8-C1F98F0F0CE1}"/>
+                <a16:creationId xmlns="" xmlns:a16="http://schemas.microsoft.com/office/drawing/2014/main" id="{3A44430D-A62E-4AF3-A7F8-C1F98F0F0CE1}"/>
               </a:ext>
             </a:extLst>
           </p:cNvPr>
@@ -11636,7 +11696,19 @@
           <a:p>
             <a:r>
               <a:rPr lang="en-US" sz="1400" dirty="0"/>
-              <a:t>We compare the actual value of assets with those expected if we earned the valuation interest rate. Note that we are working from actual to expected so all unanalyzed items are on actual values.</a:t>
+              <a:t>We compare the actual value of assets with those expected if we earned the valuation interest rate. </a:t>
+            </a:r>
+            <a:r>
+              <a:rPr lang="en-US" sz="1400" dirty="0">
+                <a:solidFill>
+                  <a:srgbClr val="C00000"/>
+                </a:solidFill>
+              </a:rPr>
+              <a:t>Note that we are working from actual to expected so all unanalyzed items are on actual values</a:t>
+            </a:r>
+            <a:r>
+              <a:rPr lang="en-US" sz="1400" dirty="0"/>
+              <a:t>.</a:t>
             </a:r>
           </a:p>
           <a:p>
@@ -11753,7 +11825,7 @@
           <p:cNvPr id="2" name="Title 1">
             <a:extLst>
               <a:ext uri="{FF2B5EF4-FFF2-40B4-BE49-F238E27FC236}">
-                <a16:creationId xmlns:a16="http://schemas.microsoft.com/office/drawing/2014/main" id="{7776D5B1-2B60-4A37-BA07-CFB5AB4EBEC1}"/>
+                <a16:creationId xmlns="" xmlns:a16="http://schemas.microsoft.com/office/drawing/2014/main" id="{7776D5B1-2B60-4A37-BA07-CFB5AB4EBEC1}"/>
               </a:ext>
             </a:extLst>
           </p:cNvPr>
@@ -11783,7 +11855,7 @@
           <p:cNvPr id="3" name="Content Placeholder 2">
             <a:extLst>
               <a:ext uri="{FF2B5EF4-FFF2-40B4-BE49-F238E27FC236}">
-                <a16:creationId xmlns:a16="http://schemas.microsoft.com/office/drawing/2014/main" id="{3A44430D-A62E-4AF3-A7F8-C1F98F0F0CE1}"/>
+                <a16:creationId xmlns="" xmlns:a16="http://schemas.microsoft.com/office/drawing/2014/main" id="{3A44430D-A62E-4AF3-A7F8-C1F98F0F0CE1}"/>
               </a:ext>
             </a:extLst>
           </p:cNvPr>
@@ -11988,7 +12060,7 @@
           <p:cNvPr id="2" name="Title 1">
             <a:extLst>
               <a:ext uri="{FF2B5EF4-FFF2-40B4-BE49-F238E27FC236}">
-                <a16:creationId xmlns:a16="http://schemas.microsoft.com/office/drawing/2014/main" id="{7776D5B1-2B60-4A37-BA07-CFB5AB4EBEC1}"/>
+                <a16:creationId xmlns="" xmlns:a16="http://schemas.microsoft.com/office/drawing/2014/main" id="{7776D5B1-2B60-4A37-BA07-CFB5AB4EBEC1}"/>
               </a:ext>
             </a:extLst>
           </p:cNvPr>
@@ -12018,7 +12090,7 @@
           <p:cNvPr id="3" name="Content Placeholder 2">
             <a:extLst>
               <a:ext uri="{FF2B5EF4-FFF2-40B4-BE49-F238E27FC236}">
-                <a16:creationId xmlns:a16="http://schemas.microsoft.com/office/drawing/2014/main" id="{3A44430D-A62E-4AF3-A7F8-C1F98F0F0CE1}"/>
+                <a16:creationId xmlns="" xmlns:a16="http://schemas.microsoft.com/office/drawing/2014/main" id="{3A44430D-A62E-4AF3-A7F8-C1F98F0F0CE1}"/>
               </a:ext>
             </a:extLst>
           </p:cNvPr>
@@ -12090,7 +12162,7 @@
           <p:cNvPr id="2" name="Title 1">
             <a:extLst>
               <a:ext uri="{FF2B5EF4-FFF2-40B4-BE49-F238E27FC236}">
-                <a16:creationId xmlns:a16="http://schemas.microsoft.com/office/drawing/2014/main" id="{7776D5B1-2B60-4A37-BA07-CFB5AB4EBEC1}"/>
+                <a16:creationId xmlns="" xmlns:a16="http://schemas.microsoft.com/office/drawing/2014/main" id="{7776D5B1-2B60-4A37-BA07-CFB5AB4EBEC1}"/>
               </a:ext>
             </a:extLst>
           </p:cNvPr>
@@ -12120,7 +12192,7 @@
           <p:cNvPr id="3" name="Content Placeholder 2">
             <a:extLst>
               <a:ext uri="{FF2B5EF4-FFF2-40B4-BE49-F238E27FC236}">
-                <a16:creationId xmlns:a16="http://schemas.microsoft.com/office/drawing/2014/main" id="{3A44430D-A62E-4AF3-A7F8-C1F98F0F0CE1}"/>
+                <a16:creationId xmlns="" xmlns:a16="http://schemas.microsoft.com/office/drawing/2014/main" id="{3A44430D-A62E-4AF3-A7F8-C1F98F0F0CE1}"/>
               </a:ext>
             </a:extLst>
           </p:cNvPr>
@@ -12186,7 +12258,7 @@
           <p:cNvPr id="2" name="Title 1">
             <a:extLst>
               <a:ext uri="{FF2B5EF4-FFF2-40B4-BE49-F238E27FC236}">
-                <a16:creationId xmlns:a16="http://schemas.microsoft.com/office/drawing/2014/main" id="{7776D5B1-2B60-4A37-BA07-CFB5AB4EBEC1}"/>
+                <a16:creationId xmlns="" xmlns:a16="http://schemas.microsoft.com/office/drawing/2014/main" id="{7776D5B1-2B60-4A37-BA07-CFB5AB4EBEC1}"/>
               </a:ext>
             </a:extLst>
           </p:cNvPr>
@@ -12216,7 +12288,7 @@
           <p:cNvPr id="3" name="Content Placeholder 2">
             <a:extLst>
               <a:ext uri="{FF2B5EF4-FFF2-40B4-BE49-F238E27FC236}">
-                <a16:creationId xmlns:a16="http://schemas.microsoft.com/office/drawing/2014/main" id="{3A44430D-A62E-4AF3-A7F8-C1F98F0F0CE1}"/>
+                <a16:creationId xmlns="" xmlns:a16="http://schemas.microsoft.com/office/drawing/2014/main" id="{3A44430D-A62E-4AF3-A7F8-C1F98F0F0CE1}"/>
               </a:ext>
             </a:extLst>
           </p:cNvPr>
@@ -12324,7 +12396,7 @@
           <p:cNvPr id="2" name="Title 1">
             <a:extLst>
               <a:ext uri="{FF2B5EF4-FFF2-40B4-BE49-F238E27FC236}">
-                <a16:creationId xmlns:a16="http://schemas.microsoft.com/office/drawing/2014/main" id="{B7DBE649-C56D-46FA-ADB2-79D212348071}"/>
+                <a16:creationId xmlns="" xmlns:a16="http://schemas.microsoft.com/office/drawing/2014/main" id="{B7DBE649-C56D-46FA-ADB2-79D212348071}"/>
               </a:ext>
             </a:extLst>
           </p:cNvPr>
@@ -12352,7 +12424,7 @@
           <p:cNvPr id="3" name="Text Placeholder 2">
             <a:extLst>
               <a:ext uri="{FF2B5EF4-FFF2-40B4-BE49-F238E27FC236}">
-                <a16:creationId xmlns:a16="http://schemas.microsoft.com/office/drawing/2014/main" id="{1EB71A1C-62C8-4B32-BFE3-923F6790DCA4}"/>
+                <a16:creationId xmlns="" xmlns:a16="http://schemas.microsoft.com/office/drawing/2014/main" id="{1EB71A1C-62C8-4B32-BFE3-923F6790DCA4}"/>
               </a:ext>
             </a:extLst>
           </p:cNvPr>
@@ -12425,7 +12497,7 @@
           <p:cNvPr id="2" name="Title 1">
             <a:extLst>
               <a:ext uri="{FF2B5EF4-FFF2-40B4-BE49-F238E27FC236}">
-                <a16:creationId xmlns:a16="http://schemas.microsoft.com/office/drawing/2014/main" id="{7776D5B1-2B60-4A37-BA07-CFB5AB4EBEC1}"/>
+                <a16:creationId xmlns="" xmlns:a16="http://schemas.microsoft.com/office/drawing/2014/main" id="{7776D5B1-2B60-4A37-BA07-CFB5AB4EBEC1}"/>
               </a:ext>
             </a:extLst>
           </p:cNvPr>
@@ -12455,7 +12527,7 @@
           <p:cNvPr id="3" name="Content Placeholder 2">
             <a:extLst>
               <a:ext uri="{FF2B5EF4-FFF2-40B4-BE49-F238E27FC236}">
-                <a16:creationId xmlns:a16="http://schemas.microsoft.com/office/drawing/2014/main" id="{3A44430D-A62E-4AF3-A7F8-C1F98F0F0CE1}"/>
+                <a16:creationId xmlns="" xmlns:a16="http://schemas.microsoft.com/office/drawing/2014/main" id="{3A44430D-A62E-4AF3-A7F8-C1F98F0F0CE1}"/>
               </a:ext>
             </a:extLst>
           </p:cNvPr>
@@ -12524,7 +12596,7 @@
           <p:cNvPr id="2" name="Title 1">
             <a:extLst>
               <a:ext uri="{FF2B5EF4-FFF2-40B4-BE49-F238E27FC236}">
-                <a16:creationId xmlns:a16="http://schemas.microsoft.com/office/drawing/2014/main" id="{6D6F1855-9A81-4F83-BE49-D618AA8BA46D}"/>
+                <a16:creationId xmlns="" xmlns:a16="http://schemas.microsoft.com/office/drawing/2014/main" id="{6D6F1855-9A81-4F83-BE49-D618AA8BA46D}"/>
               </a:ext>
             </a:extLst>
           </p:cNvPr>
@@ -12552,7 +12624,7 @@
           <p:cNvPr id="3" name="Content Placeholder 2">
             <a:extLst>
               <a:ext uri="{FF2B5EF4-FFF2-40B4-BE49-F238E27FC236}">
-                <a16:creationId xmlns:a16="http://schemas.microsoft.com/office/drawing/2014/main" id="{17C4779D-856E-4599-8355-20001FF54123}"/>
+                <a16:creationId xmlns="" xmlns:a16="http://schemas.microsoft.com/office/drawing/2014/main" id="{17C4779D-856E-4599-8355-20001FF54123}"/>
               </a:ext>
             </a:extLst>
           </p:cNvPr>
@@ -12654,7 +12726,7 @@
           <p:cNvPr id="2" name="Title 1">
             <a:extLst>
               <a:ext uri="{FF2B5EF4-FFF2-40B4-BE49-F238E27FC236}">
-                <a16:creationId xmlns:a16="http://schemas.microsoft.com/office/drawing/2014/main" id="{7776D5B1-2B60-4A37-BA07-CFB5AB4EBEC1}"/>
+                <a16:creationId xmlns="" xmlns:a16="http://schemas.microsoft.com/office/drawing/2014/main" id="{7776D5B1-2B60-4A37-BA07-CFB5AB4EBEC1}"/>
               </a:ext>
             </a:extLst>
           </p:cNvPr>
@@ -12684,7 +12756,7 @@
           <p:cNvPr id="3" name="Content Placeholder 2">
             <a:extLst>
               <a:ext uri="{FF2B5EF4-FFF2-40B4-BE49-F238E27FC236}">
-                <a16:creationId xmlns:a16="http://schemas.microsoft.com/office/drawing/2014/main" id="{3A44430D-A62E-4AF3-A7F8-C1F98F0F0CE1}"/>
+                <a16:creationId xmlns="" xmlns:a16="http://schemas.microsoft.com/office/drawing/2014/main" id="{3A44430D-A62E-4AF3-A7F8-C1F98F0F0CE1}"/>
               </a:ext>
             </a:extLst>
           </p:cNvPr>
@@ -12791,7 +12863,7 @@
           <p:cNvPr id="2" name="Title 1">
             <a:extLst>
               <a:ext uri="{FF2B5EF4-FFF2-40B4-BE49-F238E27FC236}">
-                <a16:creationId xmlns:a16="http://schemas.microsoft.com/office/drawing/2014/main" id="{7776D5B1-2B60-4A37-BA07-CFB5AB4EBEC1}"/>
+                <a16:creationId xmlns="" xmlns:a16="http://schemas.microsoft.com/office/drawing/2014/main" id="{7776D5B1-2B60-4A37-BA07-CFB5AB4EBEC1}"/>
               </a:ext>
             </a:extLst>
           </p:cNvPr>
@@ -12821,7 +12893,7 @@
           <p:cNvPr id="3" name="Content Placeholder 2">
             <a:extLst>
               <a:ext uri="{FF2B5EF4-FFF2-40B4-BE49-F238E27FC236}">
-                <a16:creationId xmlns:a16="http://schemas.microsoft.com/office/drawing/2014/main" id="{3A44430D-A62E-4AF3-A7F8-C1F98F0F0CE1}"/>
+                <a16:creationId xmlns="" xmlns:a16="http://schemas.microsoft.com/office/drawing/2014/main" id="{3A44430D-A62E-4AF3-A7F8-C1F98F0F0CE1}"/>
               </a:ext>
             </a:extLst>
           </p:cNvPr>
@@ -12920,7 +12992,7 @@
           <p:cNvPr id="2" name="Title 1">
             <a:extLst>
               <a:ext uri="{FF2B5EF4-FFF2-40B4-BE49-F238E27FC236}">
-                <a16:creationId xmlns:a16="http://schemas.microsoft.com/office/drawing/2014/main" id="{7776D5B1-2B60-4A37-BA07-CFB5AB4EBEC1}"/>
+                <a16:creationId xmlns="" xmlns:a16="http://schemas.microsoft.com/office/drawing/2014/main" id="{7776D5B1-2B60-4A37-BA07-CFB5AB4EBEC1}"/>
               </a:ext>
             </a:extLst>
           </p:cNvPr>
@@ -12950,7 +13022,7 @@
           <p:cNvPr id="9" name="Content Placeholder 8">
             <a:extLst>
               <a:ext uri="{FF2B5EF4-FFF2-40B4-BE49-F238E27FC236}">
-                <a16:creationId xmlns:a16="http://schemas.microsoft.com/office/drawing/2014/main" id="{BF56F15C-5527-459B-A018-D55404B0CD2C}"/>
+                <a16:creationId xmlns="" xmlns:a16="http://schemas.microsoft.com/office/drawing/2014/main" id="{BF56F15C-5527-459B-A018-D55404B0CD2C}"/>
               </a:ext>
             </a:extLst>
           </p:cNvPr>
@@ -12981,7 +13053,7 @@
           <p:cNvPr id="10" name="Picture 9">
             <a:extLst>
               <a:ext uri="{FF2B5EF4-FFF2-40B4-BE49-F238E27FC236}">
-                <a16:creationId xmlns:a16="http://schemas.microsoft.com/office/drawing/2014/main" id="{7B215903-3D9B-4C46-8A5F-1FA2174562C3}"/>
+                <a16:creationId xmlns="" xmlns:a16="http://schemas.microsoft.com/office/drawing/2014/main" id="{7B215903-3D9B-4C46-8A5F-1FA2174562C3}"/>
               </a:ext>
             </a:extLst>
           </p:cNvPr>
@@ -13011,7 +13083,7 @@
           <p:cNvPr id="11" name="TextBox 10">
             <a:extLst>
               <a:ext uri="{FF2B5EF4-FFF2-40B4-BE49-F238E27FC236}">
-                <a16:creationId xmlns:a16="http://schemas.microsoft.com/office/drawing/2014/main" id="{F9148C06-6D34-4E7E-B40E-A5A77A4EFCAE}"/>
+                <a16:creationId xmlns="" xmlns:a16="http://schemas.microsoft.com/office/drawing/2014/main" id="{F9148C06-6D34-4E7E-B40E-A5A77A4EFCAE}"/>
               </a:ext>
             </a:extLst>
           </p:cNvPr>
@@ -13124,7 +13196,7 @@
           <p:cNvPr id="2" name="Title 1">
             <a:extLst>
               <a:ext uri="{FF2B5EF4-FFF2-40B4-BE49-F238E27FC236}">
-                <a16:creationId xmlns:a16="http://schemas.microsoft.com/office/drawing/2014/main" id="{7776D5B1-2B60-4A37-BA07-CFB5AB4EBEC1}"/>
+                <a16:creationId xmlns="" xmlns:a16="http://schemas.microsoft.com/office/drawing/2014/main" id="{7776D5B1-2B60-4A37-BA07-CFB5AB4EBEC1}"/>
               </a:ext>
             </a:extLst>
           </p:cNvPr>
@@ -13154,7 +13226,7 @@
           <p:cNvPr id="3" name="Content Placeholder 2">
             <a:extLst>
               <a:ext uri="{FF2B5EF4-FFF2-40B4-BE49-F238E27FC236}">
-                <a16:creationId xmlns:a16="http://schemas.microsoft.com/office/drawing/2014/main" id="{3A44430D-A62E-4AF3-A7F8-C1F98F0F0CE1}"/>
+                <a16:creationId xmlns="" xmlns:a16="http://schemas.microsoft.com/office/drawing/2014/main" id="{3A44430D-A62E-4AF3-A7F8-C1F98F0F0CE1}"/>
               </a:ext>
             </a:extLst>
           </p:cNvPr>
@@ -13272,7 +13344,7 @@
           <p:cNvPr id="2" name="Title 1">
             <a:extLst>
               <a:ext uri="{FF2B5EF4-FFF2-40B4-BE49-F238E27FC236}">
-                <a16:creationId xmlns:a16="http://schemas.microsoft.com/office/drawing/2014/main" id="{7776D5B1-2B60-4A37-BA07-CFB5AB4EBEC1}"/>
+                <a16:creationId xmlns="" xmlns:a16="http://schemas.microsoft.com/office/drawing/2014/main" id="{7776D5B1-2B60-4A37-BA07-CFB5AB4EBEC1}"/>
               </a:ext>
             </a:extLst>
           </p:cNvPr>
@@ -13302,7 +13374,7 @@
           <p:cNvPr id="3" name="Content Placeholder 2">
             <a:extLst>
               <a:ext uri="{FF2B5EF4-FFF2-40B4-BE49-F238E27FC236}">
-                <a16:creationId xmlns:a16="http://schemas.microsoft.com/office/drawing/2014/main" id="{3A44430D-A62E-4AF3-A7F8-C1F98F0F0CE1}"/>
+                <a16:creationId xmlns="" xmlns:a16="http://schemas.microsoft.com/office/drawing/2014/main" id="{3A44430D-A62E-4AF3-A7F8-C1F98F0F0CE1}"/>
               </a:ext>
             </a:extLst>
           </p:cNvPr>
@@ -13380,7 +13452,7 @@
           <p:cNvPr id="2" name="Title 1">
             <a:extLst>
               <a:ext uri="{FF2B5EF4-FFF2-40B4-BE49-F238E27FC236}">
-                <a16:creationId xmlns:a16="http://schemas.microsoft.com/office/drawing/2014/main" id="{7776D5B1-2B60-4A37-BA07-CFB5AB4EBEC1}"/>
+                <a16:creationId xmlns="" xmlns:a16="http://schemas.microsoft.com/office/drawing/2014/main" id="{7776D5B1-2B60-4A37-BA07-CFB5AB4EBEC1}"/>
               </a:ext>
             </a:extLst>
           </p:cNvPr>
@@ -13410,7 +13482,7 @@
           <p:cNvPr id="3" name="Content Placeholder 2">
             <a:extLst>
               <a:ext uri="{FF2B5EF4-FFF2-40B4-BE49-F238E27FC236}">
-                <a16:creationId xmlns:a16="http://schemas.microsoft.com/office/drawing/2014/main" id="{3A44430D-A62E-4AF3-A7F8-C1F98F0F0CE1}"/>
+                <a16:creationId xmlns="" xmlns:a16="http://schemas.microsoft.com/office/drawing/2014/main" id="{3A44430D-A62E-4AF3-A7F8-C1F98F0F0CE1}"/>
               </a:ext>
             </a:extLst>
           </p:cNvPr>
@@ -13552,7 +13624,7 @@
           <p:cNvPr id="2" name="Title 1">
             <a:extLst>
               <a:ext uri="{FF2B5EF4-FFF2-40B4-BE49-F238E27FC236}">
-                <a16:creationId xmlns:a16="http://schemas.microsoft.com/office/drawing/2014/main" id="{7776D5B1-2B60-4A37-BA07-CFB5AB4EBEC1}"/>
+                <a16:creationId xmlns="" xmlns:a16="http://schemas.microsoft.com/office/drawing/2014/main" id="{7776D5B1-2B60-4A37-BA07-CFB5AB4EBEC1}"/>
               </a:ext>
             </a:extLst>
           </p:cNvPr>
@@ -13582,7 +13654,7 @@
           <p:cNvPr id="3" name="Content Placeholder 2">
             <a:extLst>
               <a:ext uri="{FF2B5EF4-FFF2-40B4-BE49-F238E27FC236}">
-                <a16:creationId xmlns:a16="http://schemas.microsoft.com/office/drawing/2014/main" id="{3A44430D-A62E-4AF3-A7F8-C1F98F0F0CE1}"/>
+                <a16:creationId xmlns="" xmlns:a16="http://schemas.microsoft.com/office/drawing/2014/main" id="{3A44430D-A62E-4AF3-A7F8-C1F98F0F0CE1}"/>
               </a:ext>
             </a:extLst>
           </p:cNvPr>
@@ -13613,7 +13685,35 @@
           <a:p>
             <a:r>
               <a:rPr lang="en-AU" dirty="0"/>
-              <a:t>If the opening valuation only considers contracts in existence as at the opening valuation date, then new business (or new members for retirement funds) is an unexpected item in the surplus arising. </a:t>
+              <a:t>If the opening valuation only considers contracts in existence as at the opening valuation date, </a:t>
+            </a:r>
+            <a:r>
+              <a:rPr lang="en-AU" dirty="0">
+                <a:solidFill>
+                  <a:srgbClr val="C00000"/>
+                </a:solidFill>
+              </a:rPr>
+              <a:t>then new business (or new members for retirement funds) is an </a:t>
+            </a:r>
+            <a:r>
+              <a:rPr lang="en-AU" b="1" dirty="0">
+                <a:solidFill>
+                  <a:srgbClr val="C00000"/>
+                </a:solidFill>
+              </a:rPr>
+              <a:t>unexpected</a:t>
+            </a:r>
+            <a:r>
+              <a:rPr lang="en-AU" dirty="0">
+                <a:solidFill>
+                  <a:srgbClr val="C00000"/>
+                </a:solidFill>
+              </a:rPr>
+              <a:t> item</a:t>
+            </a:r>
+            <a:r>
+              <a:rPr lang="en-AU" dirty="0"/>
+              <a:t> in the surplus arising. </a:t>
             </a:r>
             <a:endParaRPr lang="en-US" dirty="0"/>
           </a:p>

</xml_diff>